<commit_message>
design touch, colourpicker function
</commit_message>
<xml_diff>
--- a/DailyNotes.pptx
+++ b/DailyNotes.pptx
@@ -7,6 +7,7 @@
   <p:sldIdLst>
     <p:sldId id="256" r:id="rId2"/>
     <p:sldId id="257" r:id="rId3"/>
+    <p:sldId id="258" r:id="rId4"/>
   </p:sldIdLst>
   <p:sldSz cx="12192000" cy="6858000"/>
   <p:notesSz cx="6858000" cy="9144000"/>
@@ -105,6 +106,11 @@
       </a:defRPr>
     </a:lvl9pPr>
   </p:defaultTextStyle>
+  <p:extLst>
+    <p:ext uri="{EFAFB233-063F-42B5-8137-9DF3F51BA10A}">
+      <p15:sldGuideLst xmlns:p15="http://schemas.microsoft.com/office/powerpoint/2012/main"/>
+    </p:ext>
+  </p:extLst>
 </p:presentation>
 </file>
 
@@ -257,7 +263,7 @@
           <a:p>
             <a:fld id="{0CA6C50E-12EF-45C0-BC39-6E804D862E91}" type="datetimeFigureOut">
               <a:rPr lang="en-HK" smtClean="0"/>
-              <a:t>21/4/2020</a:t>
+              <a:t>22/4/2020</a:t>
             </a:fld>
             <a:endParaRPr lang="en-HK"/>
           </a:p>
@@ -457,7 +463,7 @@
           <a:p>
             <a:fld id="{0CA6C50E-12EF-45C0-BC39-6E804D862E91}" type="datetimeFigureOut">
               <a:rPr lang="en-HK" smtClean="0"/>
-              <a:t>21/4/2020</a:t>
+              <a:t>22/4/2020</a:t>
             </a:fld>
             <a:endParaRPr lang="en-HK"/>
           </a:p>
@@ -667,7 +673,7 @@
           <a:p>
             <a:fld id="{0CA6C50E-12EF-45C0-BC39-6E804D862E91}" type="datetimeFigureOut">
               <a:rPr lang="en-HK" smtClean="0"/>
-              <a:t>21/4/2020</a:t>
+              <a:t>22/4/2020</a:t>
             </a:fld>
             <a:endParaRPr lang="en-HK"/>
           </a:p>
@@ -867,7 +873,7 @@
           <a:p>
             <a:fld id="{0CA6C50E-12EF-45C0-BC39-6E804D862E91}" type="datetimeFigureOut">
               <a:rPr lang="en-HK" smtClean="0"/>
-              <a:t>21/4/2020</a:t>
+              <a:t>22/4/2020</a:t>
             </a:fld>
             <a:endParaRPr lang="en-HK"/>
           </a:p>
@@ -1143,7 +1149,7 @@
           <a:p>
             <a:fld id="{0CA6C50E-12EF-45C0-BC39-6E804D862E91}" type="datetimeFigureOut">
               <a:rPr lang="en-HK" smtClean="0"/>
-              <a:t>21/4/2020</a:t>
+              <a:t>22/4/2020</a:t>
             </a:fld>
             <a:endParaRPr lang="en-HK"/>
           </a:p>
@@ -1411,7 +1417,7 @@
           <a:p>
             <a:fld id="{0CA6C50E-12EF-45C0-BC39-6E804D862E91}" type="datetimeFigureOut">
               <a:rPr lang="en-HK" smtClean="0"/>
-              <a:t>21/4/2020</a:t>
+              <a:t>22/4/2020</a:t>
             </a:fld>
             <a:endParaRPr lang="en-HK"/>
           </a:p>
@@ -1826,7 +1832,7 @@
           <a:p>
             <a:fld id="{0CA6C50E-12EF-45C0-BC39-6E804D862E91}" type="datetimeFigureOut">
               <a:rPr lang="en-HK" smtClean="0"/>
-              <a:t>21/4/2020</a:t>
+              <a:t>22/4/2020</a:t>
             </a:fld>
             <a:endParaRPr lang="en-HK"/>
           </a:p>
@@ -1968,7 +1974,7 @@
           <a:p>
             <a:fld id="{0CA6C50E-12EF-45C0-BC39-6E804D862E91}" type="datetimeFigureOut">
               <a:rPr lang="en-HK" smtClean="0"/>
-              <a:t>21/4/2020</a:t>
+              <a:t>22/4/2020</a:t>
             </a:fld>
             <a:endParaRPr lang="en-HK"/>
           </a:p>
@@ -2081,7 +2087,7 @@
           <a:p>
             <a:fld id="{0CA6C50E-12EF-45C0-BC39-6E804D862E91}" type="datetimeFigureOut">
               <a:rPr lang="en-HK" smtClean="0"/>
-              <a:t>21/4/2020</a:t>
+              <a:t>22/4/2020</a:t>
             </a:fld>
             <a:endParaRPr lang="en-HK"/>
           </a:p>
@@ -2394,7 +2400,7 @@
           <a:p>
             <a:fld id="{0CA6C50E-12EF-45C0-BC39-6E804D862E91}" type="datetimeFigureOut">
               <a:rPr lang="en-HK" smtClean="0"/>
-              <a:t>21/4/2020</a:t>
+              <a:t>22/4/2020</a:t>
             </a:fld>
             <a:endParaRPr lang="en-HK"/>
           </a:p>
@@ -2683,7 +2689,7 @@
           <a:p>
             <a:fld id="{0CA6C50E-12EF-45C0-BC39-6E804D862E91}" type="datetimeFigureOut">
               <a:rPr lang="en-HK" smtClean="0"/>
-              <a:t>21/4/2020</a:t>
+              <a:t>22/4/2020</a:t>
             </a:fld>
             <a:endParaRPr lang="en-HK"/>
           </a:p>
@@ -2926,7 +2932,7 @@
           <a:p>
             <a:fld id="{0CA6C50E-12EF-45C0-BC39-6E804D862E91}" type="datetimeFigureOut">
               <a:rPr lang="en-HK" smtClean="0"/>
-              <a:t>21/4/2020</a:t>
+              <a:t>22/4/2020</a:t>
             </a:fld>
             <a:endParaRPr lang="en-HK"/>
           </a:p>
@@ -3612,6 +3618,196 @@
 </p:sld>
 </file>
 
+<file path=ppt/slides/slide3.xml><?xml version="1.0" encoding="utf-8"?>
+<p:sld xmlns:a="http://schemas.openxmlformats.org/drawingml/2006/main" xmlns:r="http://schemas.openxmlformats.org/officeDocument/2006/relationships" xmlns:p="http://schemas.openxmlformats.org/presentationml/2006/main">
+  <p:cSld>
+    <p:spTree>
+      <p:nvGrpSpPr>
+        <p:cNvPr id="1" name=""/>
+        <p:cNvGrpSpPr/>
+        <p:nvPr/>
+      </p:nvGrpSpPr>
+      <p:grpSpPr>
+        <a:xfrm>
+          <a:off x="0" y="0"/>
+          <a:ext cx="0" cy="0"/>
+          <a:chOff x="0" y="0"/>
+          <a:chExt cx="0" cy="0"/>
+        </a:xfrm>
+      </p:grpSpPr>
+      <p:sp>
+        <p:nvSpPr>
+          <p:cNvPr id="2" name="Title 1">
+            <a:extLst>
+              <a:ext uri="{FF2B5EF4-FFF2-40B4-BE49-F238E27FC236}">
+                <a16:creationId xmlns:a16="http://schemas.microsoft.com/office/drawing/2014/main" id="{76941B41-E9C3-46B0-95C9-876124697041}"/>
+              </a:ext>
+            </a:extLst>
+          </p:cNvPr>
+          <p:cNvSpPr>
+            <a:spLocks noGrp="1"/>
+          </p:cNvSpPr>
+          <p:nvPr>
+            <p:ph type="title"/>
+          </p:nvPr>
+        </p:nvSpPr>
+        <p:spPr/>
+        <p:txBody>
+          <a:bodyPr/>
+          <a:lstStyle/>
+          <a:p>
+            <a:r>
+              <a:rPr lang="en-HK" dirty="0"/>
+              <a:t>Day 3 (22</a:t>
+            </a:r>
+            <a:r>
+              <a:rPr lang="en-HK" baseline="30000" dirty="0"/>
+              <a:t>nd</a:t>
+            </a:r>
+            <a:r>
+              <a:rPr lang="en-HK" dirty="0"/>
+              <a:t>  April 2020)</a:t>
+            </a:r>
+          </a:p>
+        </p:txBody>
+      </p:sp>
+      <p:sp>
+        <p:nvSpPr>
+          <p:cNvPr id="3" name="Content Placeholder 2">
+            <a:extLst>
+              <a:ext uri="{FF2B5EF4-FFF2-40B4-BE49-F238E27FC236}">
+                <a16:creationId xmlns:a16="http://schemas.microsoft.com/office/drawing/2014/main" id="{9F56EB4D-9BD7-4378-87BC-9EEC6C47D28E}"/>
+              </a:ext>
+            </a:extLst>
+          </p:cNvPr>
+          <p:cNvSpPr>
+            <a:spLocks noGrp="1"/>
+          </p:cNvSpPr>
+          <p:nvPr>
+            <p:ph sz="half" idx="1"/>
+          </p:nvPr>
+        </p:nvSpPr>
+        <p:spPr>
+          <a:xfrm>
+            <a:off x="838200" y="1825625"/>
+            <a:ext cx="5181600" cy="4351338"/>
+          </a:xfrm>
+        </p:spPr>
+        <p:txBody>
+          <a:bodyPr/>
+          <a:lstStyle/>
+          <a:p>
+            <a:pPr marL="0" indent="0">
+              <a:buNone/>
+            </a:pPr>
+            <a:r>
+              <a:rPr lang="en-HK" dirty="0"/>
+              <a:t>Edwin:</a:t>
+            </a:r>
+          </a:p>
+          <a:p>
+            <a:pPr marL="0" indent="0">
+              <a:buNone/>
+            </a:pPr>
+            <a:r>
+              <a:rPr lang="en-HK" dirty="0"/>
+              <a:t>-</a:t>
+            </a:r>
+            <a:r>
+              <a:rPr lang="en-HK"/>
+              <a:t>Make undo redo functions </a:t>
+            </a:r>
+            <a:endParaRPr lang="en-HK" dirty="0"/>
+          </a:p>
+          <a:p>
+            <a:pPr marL="0" indent="0">
+              <a:buNone/>
+            </a:pPr>
+            <a:r>
+              <a:rPr lang="en-HK" dirty="0"/>
+              <a:t>-function that changes linewidth </a:t>
+            </a:r>
+          </a:p>
+          <a:p>
+            <a:pPr marL="0" indent="0">
+              <a:buNone/>
+            </a:pPr>
+            <a:r>
+              <a:rPr lang="en-HK" dirty="0"/>
+              <a:t>-change if the shapes fill &amp; stroke</a:t>
+            </a:r>
+          </a:p>
+        </p:txBody>
+      </p:sp>
+      <p:sp>
+        <p:nvSpPr>
+          <p:cNvPr id="4" name="Content Placeholder 3">
+            <a:extLst>
+              <a:ext uri="{FF2B5EF4-FFF2-40B4-BE49-F238E27FC236}">
+                <a16:creationId xmlns:a16="http://schemas.microsoft.com/office/drawing/2014/main" id="{AEC00C9F-FFA4-4761-8603-BB2AF38EA10D}"/>
+              </a:ext>
+            </a:extLst>
+          </p:cNvPr>
+          <p:cNvSpPr>
+            <a:spLocks noGrp="1"/>
+          </p:cNvSpPr>
+          <p:nvPr>
+            <p:ph sz="half" idx="2"/>
+          </p:nvPr>
+        </p:nvSpPr>
+        <p:spPr/>
+        <p:txBody>
+          <a:bodyPr/>
+          <a:lstStyle/>
+          <a:p>
+            <a:pPr marL="0" indent="0">
+              <a:buNone/>
+            </a:pPr>
+            <a:r>
+              <a:rPr lang="en-HK" dirty="0"/>
+              <a:t>Pullip:</a:t>
+            </a:r>
+          </a:p>
+          <a:p>
+            <a:pPr>
+              <a:buFontTx/>
+              <a:buChar char="-"/>
+            </a:pPr>
+            <a:r>
+              <a:rPr lang="en-HK" dirty="0"/>
+              <a:t>Set more details in the design frame</a:t>
+            </a:r>
+          </a:p>
+          <a:p>
+            <a:pPr>
+              <a:buFontTx/>
+              <a:buChar char="-"/>
+            </a:pPr>
+            <a:r>
+              <a:rPr lang="en-HK" dirty="0"/>
+              <a:t>Making colour library to use for </a:t>
+            </a:r>
+            <a:r>
+              <a:rPr lang="en-HK" dirty="0" err="1"/>
+              <a:t>colourpicker</a:t>
+            </a:r>
+            <a:endParaRPr lang="en-HK" dirty="0"/>
+          </a:p>
+        </p:txBody>
+      </p:sp>
+    </p:spTree>
+    <p:extLst>
+      <p:ext uri="{BB962C8B-B14F-4D97-AF65-F5344CB8AC3E}">
+        <p14:creationId xmlns:p14="http://schemas.microsoft.com/office/powerpoint/2010/main" val="2290419712"/>
+      </p:ext>
+    </p:extLst>
+  </p:cSld>
+  <p:clrMapOvr>
+    <a:masterClrMapping/>
+  </p:clrMapOvr>
+</p:sld>
+</file>
+
 <file path=ppt/theme/theme1.xml><?xml version="1.0" encoding="utf-8"?>
 <a:theme xmlns:a="http://schemas.openxmlformats.org/drawingml/2006/main" name="Office Theme">
   <a:themeElements>

</xml_diff>